<commit_message>
Update lab 04 pptx
</commit_message>
<xml_diff>
--- a/docs/presentations/Lab04.pptx
+++ b/docs/presentations/Lab04.pptx
@@ -166,9 +166,75 @@
 <file path=ppt/changesInfos/changesInfo1.xml><?xml version="1.0" encoding="utf-8"?>
 <pc:chgInfo xmlns:a="http://schemas.openxmlformats.org/drawingml/2006/main" xmlns:r="http://schemas.openxmlformats.org/officeDocument/2006/relationships" xmlns:ac="http://schemas.microsoft.com/office/drawing/2013/main/command" xmlns:pc="http://schemas.microsoft.com/office/powerpoint/2013/main/command">
   <pc:docChgLst>
+    <pc:chgData name="Aaron Rendell" userId="f27b094e-8669-4d60-ad27-0d6d2af67856" providerId="ADAL" clId="{2BB4FE60-7229-4C74-8123-17E913BF2CC0}"/>
+    <pc:docChg chg="undo custSel addSld delSld modSld modMainMaster">
+      <pc:chgData name="Aaron Rendell" userId="f27b094e-8669-4d60-ad27-0d6d2af67856" providerId="ADAL" clId="{2BB4FE60-7229-4C74-8123-17E913BF2CC0}" dt="2025-10-11T13:14:01.523" v="257"/>
+      <pc:docMkLst>
+        <pc:docMk/>
+      </pc:docMkLst>
+      <pc:sldMasterChg chg="modSldLayout">
+        <pc:chgData name="Aaron Rendell" userId="f27b094e-8669-4d60-ad27-0d6d2af67856" providerId="ADAL" clId="{2BB4FE60-7229-4C74-8123-17E913BF2CC0}" dt="2025-10-11T13:10:36.444" v="214" actId="478"/>
+        <pc:sldMasterMkLst>
+          <pc:docMk/>
+          <pc:sldMasterMk cId="2020574204" sldId="2147483648"/>
+        </pc:sldMasterMkLst>
+        <pc:sldLayoutChg chg="addSp delSp modSp mod">
+          <pc:chgData name="Aaron Rendell" userId="f27b094e-8669-4d60-ad27-0d6d2af67856" providerId="ADAL" clId="{2BB4FE60-7229-4C74-8123-17E913BF2CC0}" dt="2025-10-11T13:10:36.444" v="214" actId="478"/>
+          <pc:sldLayoutMkLst>
+            <pc:docMk/>
+            <pc:sldMasterMk cId="2020574204" sldId="2147483648"/>
+            <pc:sldLayoutMk cId="3147334202" sldId="2147483665"/>
+          </pc:sldLayoutMkLst>
+        </pc:sldLayoutChg>
+      </pc:sldMasterChg>
+      <pc:sldMasterChg chg="modSldLayout">
+        <pc:chgData name="Aaron Rendell" userId="f27b094e-8669-4d60-ad27-0d6d2af67856" providerId="ADAL" clId="{2BB4FE60-7229-4C74-8123-17E913BF2CC0}" dt="2025-10-11T10:48:07.895" v="5" actId="207"/>
+        <pc:sldMasterMkLst>
+          <pc:docMk/>
+          <pc:sldMasterMk cId="3589580110" sldId="2147483678"/>
+        </pc:sldMasterMkLst>
+        <pc:sldLayoutChg chg="addSp delSp modSp mod">
+          <pc:chgData name="Aaron Rendell" userId="f27b094e-8669-4d60-ad27-0d6d2af67856" providerId="ADAL" clId="{2BB4FE60-7229-4C74-8123-17E913BF2CC0}" dt="2025-10-11T10:48:07.895" v="5" actId="207"/>
+          <pc:sldLayoutMkLst>
+            <pc:docMk/>
+            <pc:sldMasterMk cId="3589580110" sldId="2147483678"/>
+            <pc:sldLayoutMk cId="65439216" sldId="2147483683"/>
+          </pc:sldLayoutMkLst>
+          <pc:spChg chg="add mod">
+            <ac:chgData name="Aaron Rendell" userId="f27b094e-8669-4d60-ad27-0d6d2af67856" providerId="ADAL" clId="{2BB4FE60-7229-4C74-8123-17E913BF2CC0}" dt="2025-10-11T10:48:01.376" v="4" actId="207"/>
+            <ac:spMkLst>
+              <pc:docMk/>
+              <pc:sldMasterMk cId="3589580110" sldId="2147483678"/>
+              <pc:sldLayoutMk cId="65439216" sldId="2147483683"/>
+              <ac:spMk id="6" creationId="{B5B1D4CD-C3BF-D5DB-954B-CE2AF31AB411}"/>
+            </ac:spMkLst>
+          </pc:spChg>
+          <pc:spChg chg="add mod">
+            <ac:chgData name="Aaron Rendell" userId="f27b094e-8669-4d60-ad27-0d6d2af67856" providerId="ADAL" clId="{2BB4FE60-7229-4C74-8123-17E913BF2CC0}" dt="2025-10-11T10:48:07.895" v="5" actId="207"/>
+            <ac:spMkLst>
+              <pc:docMk/>
+              <pc:sldMasterMk cId="3589580110" sldId="2147483678"/>
+              <pc:sldLayoutMk cId="65439216" sldId="2147483683"/>
+              <ac:spMk id="7" creationId="{3CDDCDEE-EAA0-A9AD-B04F-FF6B72E58CF4}"/>
+            </ac:spMkLst>
+          </pc:spChg>
+          <pc:picChg chg="add mod">
+            <ac:chgData name="Aaron Rendell" userId="f27b094e-8669-4d60-ad27-0d6d2af67856" providerId="ADAL" clId="{2BB4FE60-7229-4C74-8123-17E913BF2CC0}" dt="2025-10-11T10:47:40.069" v="3"/>
+            <ac:picMkLst>
+              <pc:docMk/>
+              <pc:sldMasterMk cId="3589580110" sldId="2147483678"/>
+              <pc:sldLayoutMk cId="65439216" sldId="2147483683"/>
+              <ac:picMk id="5" creationId="{2C75D237-F03B-ADE7-CB82-DD3A4178AF9F}"/>
+            </ac:picMkLst>
+          </pc:picChg>
+        </pc:sldLayoutChg>
+      </pc:sldMasterChg>
+    </pc:docChg>
+  </pc:docChgLst>
+  <pc:docChgLst>
     <pc:chgData name="Daniel Laskewitz" userId="004e9a81-59d4-47b4-8bee-4f6da7cf9d9d" providerId="ADAL" clId="{B7E1987E-F849-430F-A364-DDFF2666125D}"/>
     <pc:docChg chg="undo custSel addSld delSld modSld">
-      <pc:chgData name="Daniel Laskewitz" userId="004e9a81-59d4-47b4-8bee-4f6da7cf9d9d" providerId="ADAL" clId="{B7E1987E-F849-430F-A364-DDFF2666125D}" dt="2025-10-16T19:23:37.167" v="190" actId="6549"/>
+      <pc:chgData name="Daniel Laskewitz" userId="004e9a81-59d4-47b4-8bee-4f6da7cf9d9d" providerId="ADAL" clId="{B7E1987E-F849-430F-A364-DDFF2666125D}" dt="2025-10-17T12:45:47.604" v="205" actId="20577"/>
       <pc:docMkLst>
         <pc:docMk/>
       </pc:docMkLst>
@@ -443,7 +509,7 @@
         </pc:picChg>
       </pc:sldChg>
       <pc:sldChg chg="modSp add mod">
-        <pc:chgData name="Daniel Laskewitz" userId="004e9a81-59d4-47b4-8bee-4f6da7cf9d9d" providerId="ADAL" clId="{B7E1987E-F849-430F-A364-DDFF2666125D}" dt="2025-10-16T19:23:21.084" v="176" actId="20577"/>
+        <pc:chgData name="Daniel Laskewitz" userId="004e9a81-59d4-47b4-8bee-4f6da7cf9d9d" providerId="ADAL" clId="{B7E1987E-F849-430F-A364-DDFF2666125D}" dt="2025-10-17T12:45:47.604" v="205" actId="20577"/>
         <pc:sldMkLst>
           <pc:docMk/>
           <pc:sldMk cId="1041961282" sldId="314"/>
@@ -457,7 +523,7 @@
           </ac:spMkLst>
         </pc:spChg>
         <pc:spChg chg="mod">
-          <ac:chgData name="Daniel Laskewitz" userId="004e9a81-59d4-47b4-8bee-4f6da7cf9d9d" providerId="ADAL" clId="{B7E1987E-F849-430F-A364-DDFF2666125D}" dt="2025-10-16T19:23:21.084" v="176" actId="20577"/>
+          <ac:chgData name="Daniel Laskewitz" userId="004e9a81-59d4-47b4-8bee-4f6da7cf9d9d" providerId="ADAL" clId="{B7E1987E-F849-430F-A364-DDFF2666125D}" dt="2025-10-17T12:45:47.604" v="205" actId="20577"/>
           <ac:spMkLst>
             <pc:docMk/>
             <pc:sldMk cId="1041961282" sldId="314"/>
@@ -713,302 +779,6 @@
       </pc:sldMasterChg>
     </pc:docChg>
   </pc:docChgLst>
-  <pc:docChgLst>
-    <pc:chgData name="Aaron Rendell" userId="f27b094e-8669-4d60-ad27-0d6d2af67856" providerId="ADAL" clId="{2BB4FE60-7229-4C74-8123-17E913BF2CC0}"/>
-    <pc:docChg chg="undo custSel addSld delSld modSld modMainMaster">
-      <pc:chgData name="Aaron Rendell" userId="f27b094e-8669-4d60-ad27-0d6d2af67856" providerId="ADAL" clId="{2BB4FE60-7229-4C74-8123-17E913BF2CC0}" dt="2025-10-11T13:14:01.523" v="257"/>
-      <pc:docMkLst>
-        <pc:docMk/>
-      </pc:docMkLst>
-      <pc:sldChg chg="modSp add mod">
-        <pc:chgData name="Aaron Rendell" userId="f27b094e-8669-4d60-ad27-0d6d2af67856" providerId="ADAL" clId="{2BB4FE60-7229-4C74-8123-17E913BF2CC0}" dt="2025-10-11T13:02:55.364" v="111" actId="2711"/>
-        <pc:sldMkLst>
-          <pc:docMk/>
-          <pc:sldMk cId="0" sldId="257"/>
-        </pc:sldMkLst>
-        <pc:spChg chg="mod">
-          <ac:chgData name="Aaron Rendell" userId="f27b094e-8669-4d60-ad27-0d6d2af67856" providerId="ADAL" clId="{2BB4FE60-7229-4C74-8123-17E913BF2CC0}" dt="2025-10-11T13:02:55.364" v="111" actId="2711"/>
-          <ac:spMkLst>
-            <pc:docMk/>
-            <pc:sldMk cId="0" sldId="257"/>
-            <ac:spMk id="2" creationId="{00000000-0000-0000-0000-000000000000}"/>
-          </ac:spMkLst>
-        </pc:spChg>
-      </pc:sldChg>
-      <pc:sldChg chg="addSp delSp modSp add mod">
-        <pc:chgData name="Aaron Rendell" userId="f27b094e-8669-4d60-ad27-0d6d2af67856" providerId="ADAL" clId="{2BB4FE60-7229-4C74-8123-17E913BF2CC0}" dt="2025-10-11T13:09:28.219" v="208" actId="1076"/>
-        <pc:sldMkLst>
-          <pc:docMk/>
-          <pc:sldMk cId="0" sldId="303"/>
-        </pc:sldMkLst>
-        <pc:spChg chg="add mod">
-          <ac:chgData name="Aaron Rendell" userId="f27b094e-8669-4d60-ad27-0d6d2af67856" providerId="ADAL" clId="{2BB4FE60-7229-4C74-8123-17E913BF2CC0}" dt="2025-10-11T12:57:19.088" v="55" actId="207"/>
-          <ac:spMkLst>
-            <pc:docMk/>
-            <pc:sldMk cId="0" sldId="303"/>
-            <ac:spMk id="62" creationId="{6E21E196-D477-89EC-79DC-FEDE3F76D670}"/>
-          </ac:spMkLst>
-        </pc:spChg>
-        <pc:spChg chg="add mod">
-          <ac:chgData name="Aaron Rendell" userId="f27b094e-8669-4d60-ad27-0d6d2af67856" providerId="ADAL" clId="{2BB4FE60-7229-4C74-8123-17E913BF2CC0}" dt="2025-10-11T10:48:42.547" v="6"/>
-          <ac:spMkLst>
-            <pc:docMk/>
-            <pc:sldMk cId="0" sldId="303"/>
-            <ac:spMk id="64" creationId="{22FED8AD-2976-FFAD-7216-C38A1784113E}"/>
-          </ac:spMkLst>
-        </pc:spChg>
-        <pc:spChg chg="add mod">
-          <ac:chgData name="Aaron Rendell" userId="f27b094e-8669-4d60-ad27-0d6d2af67856" providerId="ADAL" clId="{2BB4FE60-7229-4C74-8123-17E913BF2CC0}" dt="2025-10-11T13:05:18.953" v="146" actId="948"/>
-          <ac:spMkLst>
-            <pc:docMk/>
-            <pc:sldMk cId="0" sldId="303"/>
-            <ac:spMk id="67" creationId="{C6AB3C38-BC31-2B58-E826-116100035A0C}"/>
-          </ac:spMkLst>
-        </pc:spChg>
-        <pc:picChg chg="mod">
-          <ac:chgData name="Aaron Rendell" userId="f27b094e-8669-4d60-ad27-0d6d2af67856" providerId="ADAL" clId="{2BB4FE60-7229-4C74-8123-17E913BF2CC0}" dt="2025-10-11T13:07:37.705" v="177" actId="1076"/>
-          <ac:picMkLst>
-            <pc:docMk/>
-            <pc:sldMk cId="0" sldId="303"/>
-            <ac:picMk id="7" creationId="{FA0751DF-6E93-367D-8563-F9929B44ED6D}"/>
-          </ac:picMkLst>
-        </pc:picChg>
-        <pc:picChg chg="mod">
-          <ac:chgData name="Aaron Rendell" userId="f27b094e-8669-4d60-ad27-0d6d2af67856" providerId="ADAL" clId="{2BB4FE60-7229-4C74-8123-17E913BF2CC0}" dt="2025-10-11T13:07:01.779" v="165" actId="1076"/>
-          <ac:picMkLst>
-            <pc:docMk/>
-            <pc:sldMk cId="0" sldId="303"/>
-            <ac:picMk id="8" creationId="{95B616BD-BC65-0D7C-59AD-4111BAA0AE6E}"/>
-          </ac:picMkLst>
-        </pc:picChg>
-        <pc:picChg chg="add mod">
-          <ac:chgData name="Aaron Rendell" userId="f27b094e-8669-4d60-ad27-0d6d2af67856" providerId="ADAL" clId="{2BB4FE60-7229-4C74-8123-17E913BF2CC0}" dt="2025-10-11T13:05:30.471" v="148" actId="1076"/>
-          <ac:picMkLst>
-            <pc:docMk/>
-            <pc:sldMk cId="0" sldId="303"/>
-            <ac:picMk id="9" creationId="{AE93EDEB-6A74-C614-12DA-AFFCA79F141D}"/>
-          </ac:picMkLst>
-        </pc:picChg>
-        <pc:picChg chg="mod">
-          <ac:chgData name="Aaron Rendell" userId="f27b094e-8669-4d60-ad27-0d6d2af67856" providerId="ADAL" clId="{2BB4FE60-7229-4C74-8123-17E913BF2CC0}" dt="2025-10-11T13:09:26.615" v="207" actId="1076"/>
-          <ac:picMkLst>
-            <pc:docMk/>
-            <pc:sldMk cId="0" sldId="303"/>
-            <ac:picMk id="14" creationId="{87D8A918-E24D-81B6-EBB8-3886FF780E29}"/>
-          </ac:picMkLst>
-        </pc:picChg>
-        <pc:picChg chg="add mod">
-          <ac:chgData name="Aaron Rendell" userId="f27b094e-8669-4d60-ad27-0d6d2af67856" providerId="ADAL" clId="{2BB4FE60-7229-4C74-8123-17E913BF2CC0}" dt="2025-10-11T13:07:51.509" v="183" actId="1076"/>
-          <ac:picMkLst>
-            <pc:docMk/>
-            <pc:sldMk cId="0" sldId="303"/>
-            <ac:picMk id="16" creationId="{15C1CBDC-C581-00E9-9FE3-A0B12DD5D2E7}"/>
-          </ac:picMkLst>
-        </pc:picChg>
-        <pc:picChg chg="mod">
-          <ac:chgData name="Aaron Rendell" userId="f27b094e-8669-4d60-ad27-0d6d2af67856" providerId="ADAL" clId="{2BB4FE60-7229-4C74-8123-17E913BF2CC0}" dt="2025-10-11T13:09:28.219" v="208" actId="1076"/>
-          <ac:picMkLst>
-            <pc:docMk/>
-            <pc:sldMk cId="0" sldId="303"/>
-            <ac:picMk id="17" creationId="{78FC5AA5-D1A6-9028-5C49-CB9B1E663C95}"/>
-          </ac:picMkLst>
-        </pc:picChg>
-        <pc:picChg chg="mod">
-          <ac:chgData name="Aaron Rendell" userId="f27b094e-8669-4d60-ad27-0d6d2af67856" providerId="ADAL" clId="{2BB4FE60-7229-4C74-8123-17E913BF2CC0}" dt="2025-10-11T13:07:07.170" v="166" actId="1076"/>
-          <ac:picMkLst>
-            <pc:docMk/>
-            <pc:sldMk cId="0" sldId="303"/>
-            <ac:picMk id="19" creationId="{7DA4843C-59F4-2523-900C-A096EAEE4CA9}"/>
-          </ac:picMkLst>
-        </pc:picChg>
-        <pc:picChg chg="mod">
-          <ac:chgData name="Aaron Rendell" userId="f27b094e-8669-4d60-ad27-0d6d2af67856" providerId="ADAL" clId="{2BB4FE60-7229-4C74-8123-17E913BF2CC0}" dt="2025-10-11T13:08:01.244" v="187" actId="1076"/>
-          <ac:picMkLst>
-            <pc:docMk/>
-            <pc:sldMk cId="0" sldId="303"/>
-            <ac:picMk id="21" creationId="{4CAE1AB5-87F1-4444-5929-EBA88D07AF6A}"/>
-          </ac:picMkLst>
-        </pc:picChg>
-        <pc:picChg chg="mod">
-          <ac:chgData name="Aaron Rendell" userId="f27b094e-8669-4d60-ad27-0d6d2af67856" providerId="ADAL" clId="{2BB4FE60-7229-4C74-8123-17E913BF2CC0}" dt="2025-10-11T13:08:05.701" v="189" actId="1076"/>
-          <ac:picMkLst>
-            <pc:docMk/>
-            <pc:sldMk cId="0" sldId="303"/>
-            <ac:picMk id="22" creationId="{AAD873D3-34C3-9EF0-BE5E-E0F93949157D}"/>
-          </ac:picMkLst>
-        </pc:picChg>
-        <pc:picChg chg="mod">
-          <ac:chgData name="Aaron Rendell" userId="f27b094e-8669-4d60-ad27-0d6d2af67856" providerId="ADAL" clId="{2BB4FE60-7229-4C74-8123-17E913BF2CC0}" dt="2025-10-11T13:08:02.672" v="188" actId="1076"/>
-          <ac:picMkLst>
-            <pc:docMk/>
-            <pc:sldMk cId="0" sldId="303"/>
-            <ac:picMk id="25" creationId="{A25DCE75-9F05-509D-3782-BD7C21AC6102}"/>
-          </ac:picMkLst>
-        </pc:picChg>
-        <pc:picChg chg="mod">
-          <ac:chgData name="Aaron Rendell" userId="f27b094e-8669-4d60-ad27-0d6d2af67856" providerId="ADAL" clId="{2BB4FE60-7229-4C74-8123-17E913BF2CC0}" dt="2025-10-11T13:07:11.733" v="167" actId="1076"/>
-          <ac:picMkLst>
-            <pc:docMk/>
-            <pc:sldMk cId="0" sldId="303"/>
-            <ac:picMk id="26" creationId="{0FB902A3-DF1A-2961-65BA-D044261FAF08}"/>
-          </ac:picMkLst>
-        </pc:picChg>
-        <pc:picChg chg="mod">
-          <ac:chgData name="Aaron Rendell" userId="f27b094e-8669-4d60-ad27-0d6d2af67856" providerId="ADAL" clId="{2BB4FE60-7229-4C74-8123-17E913BF2CC0}" dt="2025-10-11T13:06:52.929" v="161" actId="1076"/>
-          <ac:picMkLst>
-            <pc:docMk/>
-            <pc:sldMk cId="0" sldId="303"/>
-            <ac:picMk id="28" creationId="{CF14206C-FFDF-C97B-B53F-44163EE3814F}"/>
-          </ac:picMkLst>
-        </pc:picChg>
-        <pc:picChg chg="mod">
-          <ac:chgData name="Aaron Rendell" userId="f27b094e-8669-4d60-ad27-0d6d2af67856" providerId="ADAL" clId="{2BB4FE60-7229-4C74-8123-17E913BF2CC0}" dt="2025-10-11T13:07:47.582" v="181" actId="1076"/>
-          <ac:picMkLst>
-            <pc:docMk/>
-            <pc:sldMk cId="0" sldId="303"/>
-            <ac:picMk id="30" creationId="{B6220B15-37F0-3B6F-AD6D-37C31D45CCB6}"/>
-          </ac:picMkLst>
-        </pc:picChg>
-        <pc:picChg chg="add mod">
-          <ac:chgData name="Aaron Rendell" userId="f27b094e-8669-4d60-ad27-0d6d2af67856" providerId="ADAL" clId="{2BB4FE60-7229-4C74-8123-17E913BF2CC0}" dt="2025-10-11T13:05:27.265" v="147" actId="1076"/>
-          <ac:picMkLst>
-            <pc:docMk/>
-            <pc:sldMk cId="0" sldId="303"/>
-            <ac:picMk id="37" creationId="{45F6367F-411A-8CF1-739F-DAAE01A9E1BD}"/>
-          </ac:picMkLst>
-        </pc:picChg>
-        <pc:picChg chg="mod">
-          <ac:chgData name="Aaron Rendell" userId="f27b094e-8669-4d60-ad27-0d6d2af67856" providerId="ADAL" clId="{2BB4FE60-7229-4C74-8123-17E913BF2CC0}" dt="2025-10-11T13:07:49.508" v="182" actId="1076"/>
-          <ac:picMkLst>
-            <pc:docMk/>
-            <pc:sldMk cId="0" sldId="303"/>
-            <ac:picMk id="39" creationId="{CECD598A-62E7-0A2D-02C2-052DB76CDB59}"/>
-          </ac:picMkLst>
-        </pc:picChg>
-        <pc:picChg chg="mod">
-          <ac:chgData name="Aaron Rendell" userId="f27b094e-8669-4d60-ad27-0d6d2af67856" providerId="ADAL" clId="{2BB4FE60-7229-4C74-8123-17E913BF2CC0}" dt="2025-10-11T13:06:57.148" v="163" actId="1076"/>
-          <ac:picMkLst>
-            <pc:docMk/>
-            <pc:sldMk cId="0" sldId="303"/>
-            <ac:picMk id="40" creationId="{406872A8-3B46-DA6C-1506-A07C40EA190A}"/>
-          </ac:picMkLst>
-        </pc:picChg>
-        <pc:picChg chg="mod">
-          <ac:chgData name="Aaron Rendell" userId="f27b094e-8669-4d60-ad27-0d6d2af67856" providerId="ADAL" clId="{2BB4FE60-7229-4C74-8123-17E913BF2CC0}" dt="2025-10-11T13:07:43.281" v="179" actId="1076"/>
-          <ac:picMkLst>
-            <pc:docMk/>
-            <pc:sldMk cId="0" sldId="303"/>
-            <ac:picMk id="45" creationId="{41275C75-040F-D347-D9BE-75E196837B36}"/>
-          </ac:picMkLst>
-        </pc:picChg>
-        <pc:picChg chg="mod">
-          <ac:chgData name="Aaron Rendell" userId="f27b094e-8669-4d60-ad27-0d6d2af67856" providerId="ADAL" clId="{2BB4FE60-7229-4C74-8123-17E913BF2CC0}" dt="2025-10-11T13:07:45.432" v="180" actId="1076"/>
-          <ac:picMkLst>
-            <pc:docMk/>
-            <pc:sldMk cId="0" sldId="303"/>
-            <ac:picMk id="48" creationId="{AEEAD895-E88F-DA84-723B-A78C3515F665}"/>
-          </ac:picMkLst>
-        </pc:picChg>
-        <pc:picChg chg="mod">
-          <ac:chgData name="Aaron Rendell" userId="f27b094e-8669-4d60-ad27-0d6d2af67856" providerId="ADAL" clId="{2BB4FE60-7229-4C74-8123-17E913BF2CC0}" dt="2025-10-11T13:06:55.229" v="162" actId="1076"/>
-          <ac:picMkLst>
-            <pc:docMk/>
-            <pc:sldMk cId="0" sldId="303"/>
-            <ac:picMk id="51" creationId="{E2F21833-256F-5C01-9FE7-F290FDFDCD1E}"/>
-          </ac:picMkLst>
-        </pc:picChg>
-        <pc:picChg chg="mod">
-          <ac:chgData name="Aaron Rendell" userId="f27b094e-8669-4d60-ad27-0d6d2af67856" providerId="ADAL" clId="{2BB4FE60-7229-4C74-8123-17E913BF2CC0}" dt="2025-10-11T13:07:59.235" v="186" actId="1076"/>
-          <ac:picMkLst>
-            <pc:docMk/>
-            <pc:sldMk cId="0" sldId="303"/>
-            <ac:picMk id="52" creationId="{A6EF8581-5500-A010-C86D-A416E144A694}"/>
-          </ac:picMkLst>
-        </pc:picChg>
-        <pc:picChg chg="mod">
-          <ac:chgData name="Aaron Rendell" userId="f27b094e-8669-4d60-ad27-0d6d2af67856" providerId="ADAL" clId="{2BB4FE60-7229-4C74-8123-17E913BF2CC0}" dt="2025-10-11T13:06:58.715" v="164" actId="1076"/>
-          <ac:picMkLst>
-            <pc:docMk/>
-            <pc:sldMk cId="0" sldId="303"/>
-            <ac:picMk id="53" creationId="{92F44C39-2C4D-BDB0-716E-FCFAF3414340}"/>
-          </ac:picMkLst>
-        </pc:picChg>
-        <pc:picChg chg="add mod">
-          <ac:chgData name="Aaron Rendell" userId="f27b094e-8669-4d60-ad27-0d6d2af67856" providerId="ADAL" clId="{2BB4FE60-7229-4C74-8123-17E913BF2CC0}" dt="2025-10-11T13:07:57.079" v="185" actId="1076"/>
-          <ac:picMkLst>
-            <pc:docMk/>
-            <pc:sldMk cId="0" sldId="303"/>
-            <ac:picMk id="66" creationId="{6D79F296-EF43-9F70-69AE-899A836518EC}"/>
-          </ac:picMkLst>
-        </pc:picChg>
-        <pc:picChg chg="add mod">
-          <ac:chgData name="Aaron Rendell" userId="f27b094e-8669-4d60-ad27-0d6d2af67856" providerId="ADAL" clId="{2BB4FE60-7229-4C74-8123-17E913BF2CC0}" dt="2025-10-11T13:08:06.974" v="190" actId="1076"/>
-          <ac:picMkLst>
-            <pc:docMk/>
-            <pc:sldMk cId="0" sldId="303"/>
-            <ac:picMk id="1026" creationId="{358D0E93-999E-758D-2481-D49E63733DAD}"/>
-          </ac:picMkLst>
-        </pc:picChg>
-      </pc:sldChg>
-      <pc:sldMasterChg chg="modSldLayout">
-        <pc:chgData name="Aaron Rendell" userId="f27b094e-8669-4d60-ad27-0d6d2af67856" providerId="ADAL" clId="{2BB4FE60-7229-4C74-8123-17E913BF2CC0}" dt="2025-10-11T13:10:36.444" v="214" actId="478"/>
-        <pc:sldMasterMkLst>
-          <pc:docMk/>
-          <pc:sldMasterMk cId="2020574204" sldId="2147483648"/>
-        </pc:sldMasterMkLst>
-        <pc:sldLayoutChg chg="addSp delSp modSp mod">
-          <pc:chgData name="Aaron Rendell" userId="f27b094e-8669-4d60-ad27-0d6d2af67856" providerId="ADAL" clId="{2BB4FE60-7229-4C74-8123-17E913BF2CC0}" dt="2025-10-11T13:10:36.444" v="214" actId="478"/>
-          <pc:sldLayoutMkLst>
-            <pc:docMk/>
-            <pc:sldMasterMk cId="2020574204" sldId="2147483648"/>
-            <pc:sldLayoutMk cId="3147334202" sldId="2147483665"/>
-          </pc:sldLayoutMkLst>
-        </pc:sldLayoutChg>
-      </pc:sldMasterChg>
-      <pc:sldMasterChg chg="modSldLayout">
-        <pc:chgData name="Aaron Rendell" userId="f27b094e-8669-4d60-ad27-0d6d2af67856" providerId="ADAL" clId="{2BB4FE60-7229-4C74-8123-17E913BF2CC0}" dt="2025-10-11T10:48:07.895" v="5" actId="207"/>
-        <pc:sldMasterMkLst>
-          <pc:docMk/>
-          <pc:sldMasterMk cId="3589580110" sldId="2147483678"/>
-        </pc:sldMasterMkLst>
-        <pc:sldLayoutChg chg="addSp delSp modSp mod">
-          <pc:chgData name="Aaron Rendell" userId="f27b094e-8669-4d60-ad27-0d6d2af67856" providerId="ADAL" clId="{2BB4FE60-7229-4C74-8123-17E913BF2CC0}" dt="2025-10-11T10:48:07.895" v="5" actId="207"/>
-          <pc:sldLayoutMkLst>
-            <pc:docMk/>
-            <pc:sldMasterMk cId="3589580110" sldId="2147483678"/>
-            <pc:sldLayoutMk cId="65439216" sldId="2147483683"/>
-          </pc:sldLayoutMkLst>
-          <pc:spChg chg="add mod">
-            <ac:chgData name="Aaron Rendell" userId="f27b094e-8669-4d60-ad27-0d6d2af67856" providerId="ADAL" clId="{2BB4FE60-7229-4C74-8123-17E913BF2CC0}" dt="2025-10-11T10:48:01.376" v="4" actId="207"/>
-            <ac:spMkLst>
-              <pc:docMk/>
-              <pc:sldMasterMk cId="3589580110" sldId="2147483678"/>
-              <pc:sldLayoutMk cId="65439216" sldId="2147483683"/>
-              <ac:spMk id="6" creationId="{B5B1D4CD-C3BF-D5DB-954B-CE2AF31AB411}"/>
-            </ac:spMkLst>
-          </pc:spChg>
-          <pc:spChg chg="add mod">
-            <ac:chgData name="Aaron Rendell" userId="f27b094e-8669-4d60-ad27-0d6d2af67856" providerId="ADAL" clId="{2BB4FE60-7229-4C74-8123-17E913BF2CC0}" dt="2025-10-11T10:48:07.895" v="5" actId="207"/>
-            <ac:spMkLst>
-              <pc:docMk/>
-              <pc:sldMasterMk cId="3589580110" sldId="2147483678"/>
-              <pc:sldLayoutMk cId="65439216" sldId="2147483683"/>
-              <ac:spMk id="7" creationId="{3CDDCDEE-EAA0-A9AD-B04F-FF6B72E58CF4}"/>
-            </ac:spMkLst>
-          </pc:spChg>
-          <pc:picChg chg="add mod">
-            <ac:chgData name="Aaron Rendell" userId="f27b094e-8669-4d60-ad27-0d6d2af67856" providerId="ADAL" clId="{2BB4FE60-7229-4C74-8123-17E913BF2CC0}" dt="2025-10-11T10:47:40.069" v="3"/>
-            <ac:picMkLst>
-              <pc:docMk/>
-              <pc:sldMasterMk cId="3589580110" sldId="2147483678"/>
-              <pc:sldLayoutMk cId="65439216" sldId="2147483683"/>
-              <ac:picMk id="5" creationId="{2C75D237-F03B-ADE7-CB82-DD3A4178AF9F}"/>
-            </ac:picMkLst>
-          </pc:picChg>
-        </pc:sldLayoutChg>
-      </pc:sldMasterChg>
-    </pc:docChg>
-  </pc:docChgLst>
 </pc:chgInfo>
 </file>
 
@@ -1798,7 +1568,7 @@
           <a:p>
             <a:fld id="{386CE63F-9E7F-4C04-9D0D-FCA25A8E9E86}" type="datetime8">
               <a:rPr lang="en-US" smtClean="0"/>
-              <a:t>10/17/2025 13:28</a:t>
+              <a:t>10/17/2025 13:45</a:t>
             </a:fld>
             <a:endParaRPr lang="en-US"/>
           </a:p>
@@ -2008,7 +1778,7 @@
           <a:p>
             <a:fld id="{386CE63F-9E7F-4C04-9D0D-FCA25A8E9E86}" type="datetime8">
               <a:rPr lang="en-US" smtClean="0"/>
-              <a:t>10/17/2025 13:28</a:t>
+              <a:t>10/17/2025 13:45</a:t>
             </a:fld>
             <a:endParaRPr lang="en-US"/>
           </a:p>
@@ -2218,7 +1988,7 @@
           <a:p>
             <a:fld id="{386CE63F-9E7F-4C04-9D0D-FCA25A8E9E86}" type="datetime8">
               <a:rPr lang="en-US" smtClean="0"/>
-              <a:t>10/17/2025 13:28</a:t>
+              <a:t>10/17/2025 13:45</a:t>
             </a:fld>
             <a:endParaRPr lang="en-US"/>
           </a:p>
@@ -2389,7 +2159,7 @@
           <a:p>
             <a:fld id="{386CE63F-9E7F-4C04-9D0D-FCA25A8E9E86}" type="datetime8">
               <a:rPr lang="en-US" smtClean="0"/>
-              <a:t>10/17/2025 13:28</a:t>
+              <a:t>10/17/2025 13:45</a:t>
             </a:fld>
             <a:endParaRPr lang="en-US"/>
           </a:p>
@@ -2554,7 +2324,7 @@
           <a:p>
             <a:fld id="{386CE63F-9E7F-4C04-9D0D-FCA25A8E9E86}" type="datetime8">
               <a:rPr lang="en-US" smtClean="0"/>
-              <a:t>10/17/2025 13:28</a:t>
+              <a:t>10/17/2025 13:45</a:t>
             </a:fld>
             <a:endParaRPr lang="en-US"/>
           </a:p>
@@ -33307,24 +33077,22 @@
                 <a:solidFill>
                   <a:schemeClr val="accent1"/>
                 </a:solidFill>
-                <a:hlinkClick r:id="rId2">
-                  <a:extLst>
-                    <a:ext uri="{A12FA001-AC4F-418D-AE19-62706E023703}">
-                      <ahyp:hlinkClr xmlns:ahyp="http://schemas.microsoft.com/office/drawing/2018/hyperlinkcolor" val="tx"/>
-                    </a:ext>
-                  </a:extLst>
-                </a:hlinkClick>
               </a:rPr>
-              <a:t>https://aka.ms/scs25-copilot-studio-extensibility</a:t>
-            </a:r>
-            <a:r>
-              <a:rPr lang="en-US" sz="3200" dirty="0">
+              <a:t>https://aka.ms</a:t>
+            </a:r>
+            <a:r>
+              <a:rPr lang="en-US" sz="3200">
                 <a:solidFill>
                   <a:schemeClr val="accent1"/>
                 </a:solidFill>
               </a:rPr>
-              <a:t> </a:t>
-            </a:r>
+              <a:t>/scs25-copilot-studio </a:t>
+            </a:r>
+            <a:endParaRPr lang="en-US" sz="3200" dirty="0">
+              <a:solidFill>
+                <a:schemeClr val="accent1"/>
+              </a:solidFill>
+            </a:endParaRPr>
           </a:p>
         </p:txBody>
       </p:sp>
@@ -40868,17 +40636,6 @@
 </file>
 
 <file path=customXml/item1.xml><?xml version="1.0" encoding="utf-8"?>
-<p:properties xmlns:p="http://schemas.microsoft.com/office/2006/metadata/properties" xmlns:xsi="http://www.w3.org/2001/XMLSchema-instance" xmlns:pc="http://schemas.microsoft.com/office/infopath/2007/PartnerControls">
-  <documentManagement>
-    <TaxCatchAll xmlns="eaae580a-ac37-41aa-906d-085ccea5f9b3" xsi:nil="true"/>
-    <lcf76f155ced4ddcb4097134ff3c332f xmlns="01fceb86-be59-4755-9138-08d251679d60">
-      <Terms xmlns="http://schemas.microsoft.com/office/infopath/2007/PartnerControls"/>
-    </lcf76f155ced4ddcb4097134ff3c332f>
-  </documentManagement>
-</p:properties>
-</file>
-
-<file path=customXml/item2.xml><?xml version="1.0" encoding="utf-8"?>
 <ct:contentTypeSchema xmlns:ct="http://schemas.microsoft.com/office/2006/metadata/contentType" xmlns:ma="http://schemas.microsoft.com/office/2006/metadata/properties/metaAttributes" ct:_="" ma:_="" ma:contentTypeName="Document" ma:contentTypeID="0x010100CD91AD582865DC4FAE90A3B70C57AA05" ma:contentTypeVersion="11" ma:contentTypeDescription="Create a new document." ma:contentTypeScope="" ma:versionID="c31e652b9f79f83837c498a3efb172ba">
   <xsd:schema xmlns:xsd="http://www.w3.org/2001/XMLSchema" xmlns:xs="http://www.w3.org/2001/XMLSchema" xmlns:p="http://schemas.microsoft.com/office/2006/metadata/properties" xmlns:ns2="01fceb86-be59-4755-9138-08d251679d60" xmlns:ns3="eaae580a-ac37-41aa-906d-085ccea5f9b3" targetNamespace="http://schemas.microsoft.com/office/2006/metadata/properties" ma:root="true" ma:fieldsID="9c96b32a95387b2397c444c2a005e978" ns2:_="" ns3:_="">
     <xsd:import namespace="01fceb86-be59-4755-9138-08d251679d60"/>
@@ -41073,7 +40830,7 @@
 </ct:contentTypeSchema>
 </file>
 
-<file path=customXml/item3.xml><?xml version="1.0" encoding="utf-8"?>
+<file path=customXml/item2.xml><?xml version="1.0" encoding="utf-8"?>
 <?mso-contentType ?>
 <FormTemplates xmlns="http://schemas.microsoft.com/sharepoint/v3/contenttype/forms">
   <Display>DocumentLibraryForm</Display>
@@ -41082,7 +40839,45 @@
 </FormTemplates>
 </file>
 
+<file path=customXml/item3.xml><?xml version="1.0" encoding="utf-8"?>
+<p:properties xmlns:p="http://schemas.microsoft.com/office/2006/metadata/properties" xmlns:xsi="http://www.w3.org/2001/XMLSchema-instance" xmlns:pc="http://schemas.microsoft.com/office/infopath/2007/PartnerControls">
+  <documentManagement>
+    <TaxCatchAll xmlns="eaae580a-ac37-41aa-906d-085ccea5f9b3" xsi:nil="true"/>
+    <lcf76f155ced4ddcb4097134ff3c332f xmlns="01fceb86-be59-4755-9138-08d251679d60">
+      <Terms xmlns="http://schemas.microsoft.com/office/infopath/2007/PartnerControls"/>
+    </lcf76f155ced4ddcb4097134ff3c332f>
+  </documentManagement>
+</p:properties>
+</file>
+
 <file path=customXml/itemProps1.xml><?xml version="1.0" encoding="utf-8"?>
+<ds:datastoreItem xmlns:ds="http://schemas.openxmlformats.org/officeDocument/2006/customXml" ds:itemID="{0D289803-1D18-47DF-A208-58B291C1CE76}">
+  <ds:schemaRefs>
+    <ds:schemaRef ds:uri="http://schemas.microsoft.com/office/2006/metadata/contentType"/>
+    <ds:schemaRef ds:uri="http://schemas.microsoft.com/office/2006/metadata/properties/metaAttributes"/>
+    <ds:schemaRef ds:uri="http://www.w3.org/2001/XMLSchema"/>
+    <ds:schemaRef ds:uri="http://schemas.microsoft.com/office/2006/metadata/properties"/>
+    <ds:schemaRef ds:uri="01fceb86-be59-4755-9138-08d251679d60"/>
+    <ds:schemaRef ds:uri="eaae580a-ac37-41aa-906d-085ccea5f9b3"/>
+    <ds:schemaRef ds:uri="http://schemas.microsoft.com/office/2006/documentManagement/types"/>
+    <ds:schemaRef ds:uri="http://schemas.microsoft.com/office/infopath/2007/PartnerControls"/>
+    <ds:schemaRef ds:uri="http://schemas.openxmlformats.org/package/2006/metadata/core-properties"/>
+    <ds:schemaRef ds:uri="http://purl.org/dc/elements/1.1/"/>
+    <ds:schemaRef ds:uri="http://purl.org/dc/terms/"/>
+    <ds:schemaRef ds:uri="http://schemas.microsoft.com/internal/obd"/>
+  </ds:schemaRefs>
+</ds:datastoreItem>
+</file>
+
+<file path=customXml/itemProps2.xml><?xml version="1.0" encoding="utf-8"?>
+<ds:datastoreItem xmlns:ds="http://schemas.openxmlformats.org/officeDocument/2006/customXml" ds:itemID="{6F156100-9533-4411-B0C0-FA18F914F7B6}">
+  <ds:schemaRefs>
+    <ds:schemaRef ds:uri="http://schemas.microsoft.com/sharepoint/v3/contenttype/forms"/>
+  </ds:schemaRefs>
+</ds:datastoreItem>
+</file>
+
+<file path=customXml/itemProps3.xml><?xml version="1.0" encoding="utf-8"?>
 <ds:datastoreItem xmlns:ds="http://schemas.openxmlformats.org/officeDocument/2006/customXml" ds:itemID="{B2C81503-9DEF-42F3-A99B-D5E0223E195B}">
   <ds:schemaRefs>
     <ds:schemaRef ds:uri="http://purl.org/dc/terms/"/>
@@ -41101,35 +40896,8 @@
 </ds:datastoreItem>
 </file>
 
-<file path=customXml/itemProps2.xml><?xml version="1.0" encoding="utf-8"?>
-<ds:datastoreItem xmlns:ds="http://schemas.openxmlformats.org/officeDocument/2006/customXml" ds:itemID="{0D289803-1D18-47DF-A208-58B291C1CE76}">
-  <ds:schemaRefs>
-    <ds:schemaRef ds:uri="http://schemas.microsoft.com/office/2006/metadata/contentType"/>
-    <ds:schemaRef ds:uri="http://schemas.microsoft.com/office/2006/metadata/properties/metaAttributes"/>
-    <ds:schemaRef ds:uri="http://www.w3.org/2001/XMLSchema"/>
-    <ds:schemaRef ds:uri="http://schemas.microsoft.com/office/2006/metadata/properties"/>
-    <ds:schemaRef ds:uri="01fceb86-be59-4755-9138-08d251679d60"/>
-    <ds:schemaRef ds:uri="eaae580a-ac37-41aa-906d-085ccea5f9b3"/>
-    <ds:schemaRef ds:uri="http://schemas.microsoft.com/office/2006/documentManagement/types"/>
-    <ds:schemaRef ds:uri="http://schemas.microsoft.com/office/infopath/2007/PartnerControls"/>
-    <ds:schemaRef ds:uri="http://schemas.openxmlformats.org/package/2006/metadata/core-properties"/>
-    <ds:schemaRef ds:uri="http://purl.org/dc/elements/1.1/"/>
-    <ds:schemaRef ds:uri="http://purl.org/dc/terms/"/>
-    <ds:schemaRef ds:uri="http://schemas.microsoft.com/internal/obd"/>
-  </ds:schemaRefs>
-</ds:datastoreItem>
-</file>
-
-<file path=customXml/itemProps3.xml><?xml version="1.0" encoding="utf-8"?>
-<ds:datastoreItem xmlns:ds="http://schemas.openxmlformats.org/officeDocument/2006/customXml" ds:itemID="{6F156100-9533-4411-B0C0-FA18F914F7B6}">
-  <ds:schemaRefs>
-    <ds:schemaRef ds:uri="http://schemas.microsoft.com/sharepoint/v3/contenttype/forms"/>
-  </ds:schemaRefs>
-</ds:datastoreItem>
-</file>
-
 <file path=docMetadata/LabelInfo.xml><?xml version="1.0" encoding="utf-8"?>
 <clbl:labelList xmlns:clbl="http://schemas.microsoft.com/office/2020/mipLabelMetadata">
-  <clbl:label id="{87ba5c36-b7cf-4793-bbc2-bd5b3a9f95ca}" enabled="1" method="Privileged" siteId="{72f988bf-86f1-41af-91ab-2d7cd011db47}" contentBits="0" removed="0"/>
+  <clbl:label id="{87867195-f2b8-4ac2-b0b6-6bb73cb33afc}" enabled="1" method="Privileged" siteId="{72f988bf-86f1-41af-91ab-2d7cd011db47}" removed="0"/>
 </clbl:labelList>
 </file>
</xml_diff>